<commit_message>
Why do we sleep? (1.1 full)
</commit_message>
<xml_diff>
--- a/Why do we sleep/Why do we sleep.pptx
+++ b/Why do we sleep/Why do we sleep.pptx
@@ -6138,13 +6138,7 @@
               <a:rPr lang="en-US" dirty="0" smtClean="0">
                 <a:latin typeface="+mj-lt"/>
               </a:rPr>
-              <a:t>Concluding </a:t>
-            </a:r>
-            <a:r>
-              <a:rPr lang="en-US" dirty="0" smtClean="0">
-                <a:latin typeface="+mj-lt"/>
-              </a:rPr>
-              <a:t>comments</a:t>
+              <a:t>Concluding comments</a:t>
             </a:r>
           </a:p>
         </p:txBody>
@@ -6216,15 +6210,7 @@
           <a:p>
             <a:r>
               <a:rPr lang="en-US" dirty="0" smtClean="0"/>
-              <a:t>10</a:t>
-            </a:r>
-            <a:r>
-              <a:rPr lang="en-US" dirty="0" smtClean="0"/>
-              <a:t> </a:t>
-            </a:r>
-            <a:r>
-              <a:rPr lang="en-US" dirty="0" smtClean="0"/>
-              <a:t>minutes</a:t>
+              <a:t>10 minutes</a:t>
             </a:r>
             <a:endParaRPr lang="ru-RU" dirty="0"/>
           </a:p>
@@ -6597,7 +6583,6 @@
               <a:rPr lang="en-US" dirty="0"/>
               <a:t>fact the consequent activation of the immune system might increase the risk of heart disease and stroke</a:t>
             </a:r>
-            <a:endParaRPr lang="en-US" dirty="0"/>
           </a:p>
           <a:p>
             <a:endParaRPr lang="en-US" dirty="0" smtClean="0"/>
@@ -6730,7 +6715,6 @@
               <a:rPr lang="en-US" dirty="0"/>
               <a:t>Research suggests that parts of the human brain may well be asleep when it is sleep-deprived</a:t>
             </a:r>
-            <a:endParaRPr lang="en-US" dirty="0"/>
           </a:p>
           <a:p>
             <a:r>
@@ -6998,14 +6982,8 @@
           <a:p>
             <a:r>
               <a:rPr lang="en-US" dirty="0"/>
-              <a:t>The investigators hope to find out soon whether the old adage "early to bed and early to rise" really does make us, if not "wealthy and wise", at least "healthy and wise".</a:t>
-            </a:r>
-            <a:endParaRPr lang="ru-RU" dirty="0"/>
-          </a:p>
-          <a:p>
-            <a:pPr marL="0" indent="0">
-              <a:buNone/>
-            </a:pPr>
+              <a:t>The investigators hope that "early to bed and early to rise" really does make us, if not "wealthy and wise", at least "healthy and wise"</a:t>
+            </a:r>
             <a:endParaRPr lang="ru-RU" dirty="0" smtClean="0"/>
           </a:p>
         </p:txBody>

</xml_diff>

<commit_message>
Why do we sleep? (1.2 full)
</commit_message>
<xml_diff>
--- a/Why do we sleep/Why do we sleep.pptx
+++ b/Why do we sleep/Why do we sleep.pptx
@@ -9,11 +9,11 @@
     <p:sldId id="269" r:id="rId3"/>
     <p:sldId id="273" r:id="rId4"/>
     <p:sldId id="272" r:id="rId5"/>
-    <p:sldId id="271" r:id="rId6"/>
-    <p:sldId id="276" r:id="rId7"/>
-    <p:sldId id="275" r:id="rId8"/>
-    <p:sldId id="274" r:id="rId9"/>
-    <p:sldId id="265" r:id="rId10"/>
+    <p:sldId id="275" r:id="rId6"/>
+    <p:sldId id="274" r:id="rId7"/>
+    <p:sldId id="265" r:id="rId8"/>
+    <p:sldId id="271" r:id="rId9"/>
+    <p:sldId id="276" r:id="rId10"/>
   </p:sldIdLst>
   <p:sldSz cx="12192000" cy="6858000"/>
   <p:notesSz cx="6858000" cy="9144000"/>
@@ -6099,32 +6099,16 @@
           </a:p>
           <a:p>
             <a:r>
+              <a:rPr lang="en-US" dirty="0" smtClean="0">
+                <a:latin typeface="+mj-lt"/>
+              </a:rPr>
+              <a:t>What </a:t>
+            </a:r>
+            <a:r>
               <a:rPr lang="en-US" dirty="0">
                 <a:latin typeface="+mj-lt"/>
               </a:rPr>
-              <a:t>What happens when I don't get enough sleep</a:t>
-            </a:r>
-            <a:r>
-              <a:rPr lang="en-US" dirty="0" smtClean="0">
-                <a:latin typeface="+mj-lt"/>
-              </a:rPr>
-              <a:t>?</a:t>
-            </a:r>
-          </a:p>
-          <a:p>
-            <a:r>
-              <a:rPr lang="en-US" dirty="0" smtClean="0">
-                <a:latin typeface="+mj-lt"/>
-              </a:rPr>
-              <a:t>Why is it hard to think when I am tired?</a:t>
-            </a:r>
-          </a:p>
-          <a:p>
-            <a:r>
-              <a:rPr lang="en-US" dirty="0">
-                <a:latin typeface="+mj-lt"/>
-              </a:rPr>
-              <a:t>What is the role of dreaming</a:t>
+              <a:t>is the role of dreaming</a:t>
             </a:r>
             <a:r>
               <a:rPr lang="en-US" dirty="0" smtClean="0">
@@ -6534,6 +6518,335 @@
           <a:bodyPr/>
           <a:lstStyle/>
           <a:p>
+            <a:pPr algn="ctr"/>
+            <a:r>
+              <a:rPr lang="en-US" b="1" dirty="0"/>
+              <a:t>What is the role of dreaming?</a:t>
+            </a:r>
+            <a:br>
+              <a:rPr lang="en-US" b="1" dirty="0"/>
+            </a:br>
+            <a:endParaRPr lang="ru-RU" dirty="0"/>
+          </a:p>
+        </p:txBody>
+      </p:sp>
+      <p:sp>
+        <p:nvSpPr>
+          <p:cNvPr id="3" name="Объект 2"/>
+          <p:cNvSpPr>
+            <a:spLocks noGrp="1"/>
+          </p:cNvSpPr>
+          <p:nvPr>
+            <p:ph idx="1"/>
+          </p:nvPr>
+        </p:nvSpPr>
+        <p:spPr>
+          <a:xfrm>
+            <a:off x="677334" y="1831549"/>
+            <a:ext cx="8596668" cy="1418857"/>
+          </a:xfrm>
+        </p:spPr>
+        <p:txBody>
+          <a:bodyPr/>
+          <a:lstStyle/>
+          <a:p>
+            <a:r>
+              <a:rPr lang="en-US" dirty="0"/>
+              <a:t>More recently, a team at the ATR Computational Neuroscience Laboratories in Kyoto in Japan has begun trying to answer some of these questions by building the beginnings of a </a:t>
+            </a:r>
+            <a:r>
+              <a:rPr lang="en-US" b="1" u="sng" dirty="0">
+                <a:hlinkClick r:id="rId2"/>
+              </a:rPr>
+              <a:t>dream-reading machine</a:t>
+            </a:r>
+            <a:endParaRPr lang="ru-RU" dirty="0"/>
+          </a:p>
+        </p:txBody>
+      </p:sp>
+      <p:pic>
+        <p:nvPicPr>
+          <p:cNvPr id="3074" name="Picture 2" descr="Dream"/>
+          <p:cNvPicPr>
+            <a:picLocks noChangeAspect="1" noChangeArrowheads="1"/>
+          </p:cNvPicPr>
+          <p:nvPr/>
+        </p:nvPicPr>
+        <p:blipFill>
+          <a:blip r:embed="rId3">
+            <a:extLst>
+              <a:ext uri="{28A0092B-C50C-407E-A947-70E740481C1C}">
+                <a14:useLocalDpi xmlns:a14="http://schemas.microsoft.com/office/drawing/2010/main" val="0"/>
+              </a:ext>
+            </a:extLst>
+          </a:blip>
+          <a:srcRect/>
+          <a:stretch>
+            <a:fillRect/>
+          </a:stretch>
+        </p:blipFill>
+        <p:spPr bwMode="auto">
+          <a:xfrm>
+            <a:off x="2832665" y="3837949"/>
+            <a:ext cx="4426683" cy="2490009"/>
+          </a:xfrm>
+          <a:prstGeom prst="rect">
+            <a:avLst/>
+          </a:prstGeom>
+          <a:noFill/>
+          <a:extLst>
+            <a:ext uri="{909E8E84-426E-40DD-AFC4-6F175D3DCCD1}">
+              <a14:hiddenFill xmlns:a14="http://schemas.microsoft.com/office/drawing/2010/main">
+                <a:solidFill>
+                  <a:srgbClr val="FFFFFF"/>
+                </a:solidFill>
+              </a14:hiddenFill>
+            </a:ext>
+          </a:extLst>
+        </p:spPr>
+      </p:pic>
+    </p:spTree>
+    <p:extLst>
+      <p:ext uri="{BB962C8B-B14F-4D97-AF65-F5344CB8AC3E}">
+        <p14:creationId xmlns:p14="http://schemas.microsoft.com/office/powerpoint/2010/main" val="1937038960"/>
+      </p:ext>
+    </p:extLst>
+  </p:cSld>
+  <p:clrMapOvr>
+    <a:masterClrMapping/>
+  </p:clrMapOvr>
+</p:sld>
+</file>
+
+<file path=ppt/slides/slide6.xml><?xml version="1.0" encoding="utf-8"?>
+<p:sld xmlns:a="http://schemas.openxmlformats.org/drawingml/2006/main" xmlns:r="http://schemas.openxmlformats.org/officeDocument/2006/relationships" xmlns:p="http://schemas.openxmlformats.org/presentationml/2006/main">
+  <p:cSld>
+    <p:spTree>
+      <p:nvGrpSpPr>
+        <p:cNvPr id="1" name=""/>
+        <p:cNvGrpSpPr/>
+        <p:nvPr/>
+      </p:nvGrpSpPr>
+      <p:grpSpPr>
+        <a:xfrm>
+          <a:off x="0" y="0"/>
+          <a:ext cx="0" cy="0"/>
+          <a:chOff x="0" y="0"/>
+          <a:chExt cx="0" cy="0"/>
+        </a:xfrm>
+      </p:grpSpPr>
+      <p:sp>
+        <p:nvSpPr>
+          <p:cNvPr id="2" name="Заголовок 1"/>
+          <p:cNvSpPr>
+            <a:spLocks noGrp="1"/>
+          </p:cNvSpPr>
+          <p:nvPr>
+            <p:ph type="title"/>
+          </p:nvPr>
+        </p:nvSpPr>
+        <p:spPr/>
+        <p:txBody>
+          <a:bodyPr/>
+          <a:lstStyle/>
+          <a:p>
+            <a:pPr algn="ctr"/>
+            <a:r>
+              <a:rPr lang="en-US" dirty="0"/>
+              <a:t>Concluding comments</a:t>
+            </a:r>
+          </a:p>
+        </p:txBody>
+      </p:sp>
+      <p:sp>
+        <p:nvSpPr>
+          <p:cNvPr id="6" name="Объект 2"/>
+          <p:cNvSpPr>
+            <a:spLocks noGrp="1"/>
+          </p:cNvSpPr>
+          <p:nvPr>
+            <p:ph idx="1"/>
+          </p:nvPr>
+        </p:nvSpPr>
+        <p:spPr>
+          <a:xfrm>
+            <a:off x="409739" y="1742867"/>
+            <a:ext cx="8596668" cy="3692733"/>
+          </a:xfrm>
+        </p:spPr>
+        <p:txBody>
+          <a:bodyPr>
+            <a:normAutofit/>
+          </a:bodyPr>
+          <a:lstStyle/>
+          <a:p>
+            <a:r>
+              <a:rPr lang="en-US" dirty="0"/>
+              <a:t>The investigators hope that "early to bed and early to rise" really does make us, if not "wealthy and wise", at least "healthy and wise"</a:t>
+            </a:r>
+            <a:endParaRPr lang="ru-RU" dirty="0" smtClean="0"/>
+          </a:p>
+        </p:txBody>
+      </p:sp>
+      <p:pic>
+        <p:nvPicPr>
+          <p:cNvPr id="4098" name="Picture 2" descr="Modern life"/>
+          <p:cNvPicPr>
+            <a:picLocks noChangeAspect="1" noChangeArrowheads="1"/>
+          </p:cNvPicPr>
+          <p:nvPr/>
+        </p:nvPicPr>
+        <p:blipFill>
+          <a:blip r:embed="rId2">
+            <a:extLst>
+              <a:ext uri="{28A0092B-C50C-407E-A947-70E740481C1C}">
+                <a14:useLocalDpi xmlns:a14="http://schemas.microsoft.com/office/drawing/2010/main" val="0"/>
+              </a:ext>
+            </a:extLst>
+          </a:blip>
+          <a:srcRect/>
+          <a:stretch>
+            <a:fillRect/>
+          </a:stretch>
+        </p:blipFill>
+        <p:spPr bwMode="auto">
+          <a:xfrm>
+            <a:off x="2003868" y="3134006"/>
+            <a:ext cx="5943600" cy="3343275"/>
+          </a:xfrm>
+          <a:prstGeom prst="rect">
+            <a:avLst/>
+          </a:prstGeom>
+          <a:noFill/>
+          <a:extLst>
+            <a:ext uri="{909E8E84-426E-40DD-AFC4-6F175D3DCCD1}">
+              <a14:hiddenFill xmlns:a14="http://schemas.microsoft.com/office/drawing/2010/main">
+                <a:solidFill>
+                  <a:srgbClr val="FFFFFF"/>
+                </a:solidFill>
+              </a14:hiddenFill>
+            </a:ext>
+          </a:extLst>
+        </p:spPr>
+      </p:pic>
+    </p:spTree>
+    <p:extLst>
+      <p:ext uri="{BB962C8B-B14F-4D97-AF65-F5344CB8AC3E}">
+        <p14:creationId xmlns:p14="http://schemas.microsoft.com/office/powerpoint/2010/main" val="3643544035"/>
+      </p:ext>
+    </p:extLst>
+  </p:cSld>
+  <p:clrMapOvr>
+    <a:masterClrMapping/>
+  </p:clrMapOvr>
+  <p:timing>
+    <p:tnLst>
+      <p:par>
+        <p:cTn id="1" dur="indefinite" restart="never" nodeType="tmRoot"/>
+      </p:par>
+    </p:tnLst>
+  </p:timing>
+</p:sld>
+</file>
+
+<file path=ppt/slides/slide7.xml><?xml version="1.0" encoding="utf-8"?>
+<p:sld xmlns:a="http://schemas.openxmlformats.org/drawingml/2006/main" xmlns:r="http://schemas.openxmlformats.org/officeDocument/2006/relationships" xmlns:p="http://schemas.openxmlformats.org/presentationml/2006/main">
+  <p:cSld>
+    <p:spTree>
+      <p:nvGrpSpPr>
+        <p:cNvPr id="1" name=""/>
+        <p:cNvGrpSpPr/>
+        <p:nvPr/>
+      </p:nvGrpSpPr>
+      <p:grpSpPr>
+        <a:xfrm>
+          <a:off x="0" y="0"/>
+          <a:ext cx="0" cy="0"/>
+          <a:chOff x="0" y="0"/>
+          <a:chExt cx="0" cy="0"/>
+        </a:xfrm>
+      </p:grpSpPr>
+      <p:sp>
+        <p:nvSpPr>
+          <p:cNvPr id="2" name="Заголовок 1"/>
+          <p:cNvSpPr>
+            <a:spLocks noGrp="1"/>
+          </p:cNvSpPr>
+          <p:nvPr>
+            <p:ph type="title"/>
+          </p:nvPr>
+        </p:nvSpPr>
+        <p:spPr>
+          <a:xfrm>
+            <a:off x="669518" y="2149230"/>
+            <a:ext cx="8596668" cy="1320800"/>
+          </a:xfrm>
+        </p:spPr>
+        <p:txBody>
+          <a:bodyPr/>
+          <a:lstStyle/>
+          <a:p>
+            <a:pPr algn="ctr"/>
+            <a:r>
+              <a:rPr lang="en-US" dirty="0" smtClean="0"/>
+              <a:t>Thank you for your attention!</a:t>
+            </a:r>
+            <a:endParaRPr lang="ru-RU" dirty="0"/>
+          </a:p>
+        </p:txBody>
+      </p:sp>
+    </p:spTree>
+    <p:extLst>
+      <p:ext uri="{BB962C8B-B14F-4D97-AF65-F5344CB8AC3E}">
+        <p14:creationId xmlns:p14="http://schemas.microsoft.com/office/powerpoint/2010/main" val="3087094628"/>
+      </p:ext>
+    </p:extLst>
+  </p:cSld>
+  <p:clrMapOvr>
+    <a:masterClrMapping/>
+  </p:clrMapOvr>
+  <p:timing>
+    <p:tnLst>
+      <p:par>
+        <p:cTn id="1" dur="indefinite" restart="never" nodeType="tmRoot"/>
+      </p:par>
+    </p:tnLst>
+  </p:timing>
+</p:sld>
+</file>
+
+<file path=ppt/slides/slide8.xml><?xml version="1.0" encoding="utf-8"?>
+<p:sld xmlns:a="http://schemas.openxmlformats.org/drawingml/2006/main" xmlns:r="http://schemas.openxmlformats.org/officeDocument/2006/relationships" xmlns:p="http://schemas.openxmlformats.org/presentationml/2006/main">
+  <p:cSld>
+    <p:spTree>
+      <p:nvGrpSpPr>
+        <p:cNvPr id="1" name=""/>
+        <p:cNvGrpSpPr/>
+        <p:nvPr/>
+      </p:nvGrpSpPr>
+      <p:grpSpPr>
+        <a:xfrm>
+          <a:off x="0" y="0"/>
+          <a:ext cx="0" cy="0"/>
+          <a:chOff x="0" y="0"/>
+          <a:chExt cx="0" cy="0"/>
+        </a:xfrm>
+      </p:grpSpPr>
+      <p:sp>
+        <p:nvSpPr>
+          <p:cNvPr id="2" name="Заголовок 1"/>
+          <p:cNvSpPr>
+            <a:spLocks noGrp="1"/>
+          </p:cNvSpPr>
+          <p:nvPr>
+            <p:ph type="title"/>
+          </p:nvPr>
+        </p:nvSpPr>
+        <p:spPr/>
+        <p:txBody>
+          <a:bodyPr/>
+          <a:lstStyle/>
+          <a:p>
             <a:pPr algn="ctr" fontAlgn="base"/>
             <a:r>
               <a:rPr lang="en-US" b="1" dirty="0"/>
@@ -6650,7 +6963,7 @@
 </p:sld>
 </file>
 
-<file path=ppt/slides/slide6.xml><?xml version="1.0" encoding="utf-8"?>
+<file path=ppt/slides/slide9.xml><?xml version="1.0" encoding="utf-8"?>
 <p:sld xmlns:a="http://schemas.openxmlformats.org/drawingml/2006/main" xmlns:r="http://schemas.openxmlformats.org/officeDocument/2006/relationships" xmlns:p="http://schemas.openxmlformats.org/presentationml/2006/main">
   <p:cSld>
     <p:spTree>
@@ -6770,335 +7083,6 @@
     <p:extLst>
       <p:ext uri="{BB962C8B-B14F-4D97-AF65-F5344CB8AC3E}">
         <p14:creationId xmlns:p14="http://schemas.microsoft.com/office/powerpoint/2010/main" val="3388354223"/>
-      </p:ext>
-    </p:extLst>
-  </p:cSld>
-  <p:clrMapOvr>
-    <a:masterClrMapping/>
-  </p:clrMapOvr>
-  <p:timing>
-    <p:tnLst>
-      <p:par>
-        <p:cTn id="1" dur="indefinite" restart="never" nodeType="tmRoot"/>
-      </p:par>
-    </p:tnLst>
-  </p:timing>
-</p:sld>
-</file>
-
-<file path=ppt/slides/slide7.xml><?xml version="1.0" encoding="utf-8"?>
-<p:sld xmlns:a="http://schemas.openxmlformats.org/drawingml/2006/main" xmlns:r="http://schemas.openxmlformats.org/officeDocument/2006/relationships" xmlns:p="http://schemas.openxmlformats.org/presentationml/2006/main">
-  <p:cSld>
-    <p:spTree>
-      <p:nvGrpSpPr>
-        <p:cNvPr id="1" name=""/>
-        <p:cNvGrpSpPr/>
-        <p:nvPr/>
-      </p:nvGrpSpPr>
-      <p:grpSpPr>
-        <a:xfrm>
-          <a:off x="0" y="0"/>
-          <a:ext cx="0" cy="0"/>
-          <a:chOff x="0" y="0"/>
-          <a:chExt cx="0" cy="0"/>
-        </a:xfrm>
-      </p:grpSpPr>
-      <p:sp>
-        <p:nvSpPr>
-          <p:cNvPr id="2" name="Заголовок 1"/>
-          <p:cNvSpPr>
-            <a:spLocks noGrp="1"/>
-          </p:cNvSpPr>
-          <p:nvPr>
-            <p:ph type="title"/>
-          </p:nvPr>
-        </p:nvSpPr>
-        <p:spPr/>
-        <p:txBody>
-          <a:bodyPr/>
-          <a:lstStyle/>
-          <a:p>
-            <a:pPr algn="ctr"/>
-            <a:r>
-              <a:rPr lang="en-US" b="1" dirty="0"/>
-              <a:t>What is the role of dreaming?</a:t>
-            </a:r>
-            <a:br>
-              <a:rPr lang="en-US" b="1" dirty="0"/>
-            </a:br>
-            <a:endParaRPr lang="ru-RU" dirty="0"/>
-          </a:p>
-        </p:txBody>
-      </p:sp>
-      <p:sp>
-        <p:nvSpPr>
-          <p:cNvPr id="3" name="Объект 2"/>
-          <p:cNvSpPr>
-            <a:spLocks noGrp="1"/>
-          </p:cNvSpPr>
-          <p:nvPr>
-            <p:ph idx="1"/>
-          </p:nvPr>
-        </p:nvSpPr>
-        <p:spPr>
-          <a:xfrm>
-            <a:off x="677334" y="1831549"/>
-            <a:ext cx="8596668" cy="1418857"/>
-          </a:xfrm>
-        </p:spPr>
-        <p:txBody>
-          <a:bodyPr/>
-          <a:lstStyle/>
-          <a:p>
-            <a:r>
-              <a:rPr lang="en-US" dirty="0"/>
-              <a:t>More recently, a team at the ATR Computational Neuroscience Laboratories in Kyoto in Japan has begun trying to answer some of these questions by building the beginnings of a </a:t>
-            </a:r>
-            <a:r>
-              <a:rPr lang="en-US" b="1" u="sng" dirty="0">
-                <a:hlinkClick r:id="rId2"/>
-              </a:rPr>
-              <a:t>dream-reading machine</a:t>
-            </a:r>
-            <a:endParaRPr lang="ru-RU" dirty="0"/>
-          </a:p>
-        </p:txBody>
-      </p:sp>
-      <p:pic>
-        <p:nvPicPr>
-          <p:cNvPr id="3074" name="Picture 2" descr="Dream"/>
-          <p:cNvPicPr>
-            <a:picLocks noChangeAspect="1" noChangeArrowheads="1"/>
-          </p:cNvPicPr>
-          <p:nvPr/>
-        </p:nvPicPr>
-        <p:blipFill>
-          <a:blip r:embed="rId3">
-            <a:extLst>
-              <a:ext uri="{28A0092B-C50C-407E-A947-70E740481C1C}">
-                <a14:useLocalDpi xmlns:a14="http://schemas.microsoft.com/office/drawing/2010/main" val="0"/>
-              </a:ext>
-            </a:extLst>
-          </a:blip>
-          <a:srcRect/>
-          <a:stretch>
-            <a:fillRect/>
-          </a:stretch>
-        </p:blipFill>
-        <p:spPr bwMode="auto">
-          <a:xfrm>
-            <a:off x="2832665" y="3837949"/>
-            <a:ext cx="4426683" cy="2490009"/>
-          </a:xfrm>
-          <a:prstGeom prst="rect">
-            <a:avLst/>
-          </a:prstGeom>
-          <a:noFill/>
-          <a:extLst>
-            <a:ext uri="{909E8E84-426E-40DD-AFC4-6F175D3DCCD1}">
-              <a14:hiddenFill xmlns:a14="http://schemas.microsoft.com/office/drawing/2010/main">
-                <a:solidFill>
-                  <a:srgbClr val="FFFFFF"/>
-                </a:solidFill>
-              </a14:hiddenFill>
-            </a:ext>
-          </a:extLst>
-        </p:spPr>
-      </p:pic>
-    </p:spTree>
-    <p:extLst>
-      <p:ext uri="{BB962C8B-B14F-4D97-AF65-F5344CB8AC3E}">
-        <p14:creationId xmlns:p14="http://schemas.microsoft.com/office/powerpoint/2010/main" val="1937038960"/>
-      </p:ext>
-    </p:extLst>
-  </p:cSld>
-  <p:clrMapOvr>
-    <a:masterClrMapping/>
-  </p:clrMapOvr>
-</p:sld>
-</file>
-
-<file path=ppt/slides/slide8.xml><?xml version="1.0" encoding="utf-8"?>
-<p:sld xmlns:a="http://schemas.openxmlformats.org/drawingml/2006/main" xmlns:r="http://schemas.openxmlformats.org/officeDocument/2006/relationships" xmlns:p="http://schemas.openxmlformats.org/presentationml/2006/main">
-  <p:cSld>
-    <p:spTree>
-      <p:nvGrpSpPr>
-        <p:cNvPr id="1" name=""/>
-        <p:cNvGrpSpPr/>
-        <p:nvPr/>
-      </p:nvGrpSpPr>
-      <p:grpSpPr>
-        <a:xfrm>
-          <a:off x="0" y="0"/>
-          <a:ext cx="0" cy="0"/>
-          <a:chOff x="0" y="0"/>
-          <a:chExt cx="0" cy="0"/>
-        </a:xfrm>
-      </p:grpSpPr>
-      <p:sp>
-        <p:nvSpPr>
-          <p:cNvPr id="2" name="Заголовок 1"/>
-          <p:cNvSpPr>
-            <a:spLocks noGrp="1"/>
-          </p:cNvSpPr>
-          <p:nvPr>
-            <p:ph type="title"/>
-          </p:nvPr>
-        </p:nvSpPr>
-        <p:spPr/>
-        <p:txBody>
-          <a:bodyPr/>
-          <a:lstStyle/>
-          <a:p>
-            <a:pPr algn="ctr"/>
-            <a:r>
-              <a:rPr lang="en-US" dirty="0"/>
-              <a:t>Concluding comments</a:t>
-            </a:r>
-          </a:p>
-        </p:txBody>
-      </p:sp>
-      <p:sp>
-        <p:nvSpPr>
-          <p:cNvPr id="6" name="Объект 2"/>
-          <p:cNvSpPr>
-            <a:spLocks noGrp="1"/>
-          </p:cNvSpPr>
-          <p:nvPr>
-            <p:ph idx="1"/>
-          </p:nvPr>
-        </p:nvSpPr>
-        <p:spPr>
-          <a:xfrm>
-            <a:off x="409739" y="1742867"/>
-            <a:ext cx="8596668" cy="3692733"/>
-          </a:xfrm>
-        </p:spPr>
-        <p:txBody>
-          <a:bodyPr>
-            <a:normAutofit/>
-          </a:bodyPr>
-          <a:lstStyle/>
-          <a:p>
-            <a:r>
-              <a:rPr lang="en-US" dirty="0"/>
-              <a:t>The investigators hope that "early to bed and early to rise" really does make us, if not "wealthy and wise", at least "healthy and wise"</a:t>
-            </a:r>
-            <a:endParaRPr lang="ru-RU" dirty="0" smtClean="0"/>
-          </a:p>
-        </p:txBody>
-      </p:sp>
-      <p:pic>
-        <p:nvPicPr>
-          <p:cNvPr id="4098" name="Picture 2" descr="Modern life"/>
-          <p:cNvPicPr>
-            <a:picLocks noChangeAspect="1" noChangeArrowheads="1"/>
-          </p:cNvPicPr>
-          <p:nvPr/>
-        </p:nvPicPr>
-        <p:blipFill>
-          <a:blip r:embed="rId2">
-            <a:extLst>
-              <a:ext uri="{28A0092B-C50C-407E-A947-70E740481C1C}">
-                <a14:useLocalDpi xmlns:a14="http://schemas.microsoft.com/office/drawing/2010/main" val="0"/>
-              </a:ext>
-            </a:extLst>
-          </a:blip>
-          <a:srcRect/>
-          <a:stretch>
-            <a:fillRect/>
-          </a:stretch>
-        </p:blipFill>
-        <p:spPr bwMode="auto">
-          <a:xfrm>
-            <a:off x="2003868" y="3134006"/>
-            <a:ext cx="5943600" cy="3343275"/>
-          </a:xfrm>
-          <a:prstGeom prst="rect">
-            <a:avLst/>
-          </a:prstGeom>
-          <a:noFill/>
-          <a:extLst>
-            <a:ext uri="{909E8E84-426E-40DD-AFC4-6F175D3DCCD1}">
-              <a14:hiddenFill xmlns:a14="http://schemas.microsoft.com/office/drawing/2010/main">
-                <a:solidFill>
-                  <a:srgbClr val="FFFFFF"/>
-                </a:solidFill>
-              </a14:hiddenFill>
-            </a:ext>
-          </a:extLst>
-        </p:spPr>
-      </p:pic>
-    </p:spTree>
-    <p:extLst>
-      <p:ext uri="{BB962C8B-B14F-4D97-AF65-F5344CB8AC3E}">
-        <p14:creationId xmlns:p14="http://schemas.microsoft.com/office/powerpoint/2010/main" val="3643544035"/>
-      </p:ext>
-    </p:extLst>
-  </p:cSld>
-  <p:clrMapOvr>
-    <a:masterClrMapping/>
-  </p:clrMapOvr>
-  <p:timing>
-    <p:tnLst>
-      <p:par>
-        <p:cTn id="1" dur="indefinite" restart="never" nodeType="tmRoot"/>
-      </p:par>
-    </p:tnLst>
-  </p:timing>
-</p:sld>
-</file>
-
-<file path=ppt/slides/slide9.xml><?xml version="1.0" encoding="utf-8"?>
-<p:sld xmlns:a="http://schemas.openxmlformats.org/drawingml/2006/main" xmlns:r="http://schemas.openxmlformats.org/officeDocument/2006/relationships" xmlns:p="http://schemas.openxmlformats.org/presentationml/2006/main">
-  <p:cSld>
-    <p:spTree>
-      <p:nvGrpSpPr>
-        <p:cNvPr id="1" name=""/>
-        <p:cNvGrpSpPr/>
-        <p:nvPr/>
-      </p:nvGrpSpPr>
-      <p:grpSpPr>
-        <a:xfrm>
-          <a:off x="0" y="0"/>
-          <a:ext cx="0" cy="0"/>
-          <a:chOff x="0" y="0"/>
-          <a:chExt cx="0" cy="0"/>
-        </a:xfrm>
-      </p:grpSpPr>
-      <p:sp>
-        <p:nvSpPr>
-          <p:cNvPr id="2" name="Заголовок 1"/>
-          <p:cNvSpPr>
-            <a:spLocks noGrp="1"/>
-          </p:cNvSpPr>
-          <p:nvPr>
-            <p:ph type="title"/>
-          </p:nvPr>
-        </p:nvSpPr>
-        <p:spPr>
-          <a:xfrm>
-            <a:off x="669518" y="2149230"/>
-            <a:ext cx="8596668" cy="1320800"/>
-          </a:xfrm>
-        </p:spPr>
-        <p:txBody>
-          <a:bodyPr/>
-          <a:lstStyle/>
-          <a:p>
-            <a:pPr algn="ctr"/>
-            <a:r>
-              <a:rPr lang="en-US" dirty="0" smtClean="0"/>
-              <a:t>Thank you for your attention!</a:t>
-            </a:r>
-            <a:endParaRPr lang="ru-RU" dirty="0"/>
-          </a:p>
-        </p:txBody>
-      </p:sp>
-    </p:spTree>
-    <p:extLst>
-      <p:ext uri="{BB962C8B-B14F-4D97-AF65-F5344CB8AC3E}">
-        <p14:creationId xmlns:p14="http://schemas.microsoft.com/office/powerpoint/2010/main" val="3087094628"/>
       </p:ext>
     </p:extLst>
   </p:cSld>

</xml_diff>